<commit_message>
ppt with drawing schemes of logo
</commit_message>
<xml_diff>
--- a/atas de reuniao/desenhos.pptx
+++ b/atas de reuniao/desenhos.pptx
@@ -10,6 +10,7 @@
     <p:sldId id="257" r:id="rId4"/>
     <p:sldId id="261" r:id="rId5"/>
     <p:sldId id="262" r:id="rId6"/>
+    <p:sldId id="263" r:id="rId7"/>
   </p:sldIdLst>
   <p:sldSz cx="12192000" cy="6858000"/>
   <p:notesSz cx="6858000" cy="9144000"/>
@@ -17,8 +18,8 @@
     <a:defPPr>
       <a:defRPr lang="en-US"/>
     </a:defPPr>
-    <a:lvl1pPr marL="0" algn="l" defTabSz="914400" rtl="0" eaLnBrk="1" latinLnBrk="0" hangingPunct="1">
-      <a:defRPr sz="1800" kern="1200">
+    <a:lvl1pPr marL="0" algn="l" defTabSz="914388" rtl="0" eaLnBrk="1" latinLnBrk="0" hangingPunct="1">
+      <a:defRPr sz="1801" kern="1200">
         <a:solidFill>
           <a:schemeClr val="tx1"/>
         </a:solidFill>
@@ -27,8 +28,8 @@
         <a:cs typeface="+mn-cs"/>
       </a:defRPr>
     </a:lvl1pPr>
-    <a:lvl2pPr marL="457200" algn="l" defTabSz="914400" rtl="0" eaLnBrk="1" latinLnBrk="0" hangingPunct="1">
-      <a:defRPr sz="1800" kern="1200">
+    <a:lvl2pPr marL="457194" algn="l" defTabSz="914388" rtl="0" eaLnBrk="1" latinLnBrk="0" hangingPunct="1">
+      <a:defRPr sz="1801" kern="1200">
         <a:solidFill>
           <a:schemeClr val="tx1"/>
         </a:solidFill>
@@ -37,8 +38,8 @@
         <a:cs typeface="+mn-cs"/>
       </a:defRPr>
     </a:lvl2pPr>
-    <a:lvl3pPr marL="914400" algn="l" defTabSz="914400" rtl="0" eaLnBrk="1" latinLnBrk="0" hangingPunct="1">
-      <a:defRPr sz="1800" kern="1200">
+    <a:lvl3pPr marL="914388" algn="l" defTabSz="914388" rtl="0" eaLnBrk="1" latinLnBrk="0" hangingPunct="1">
+      <a:defRPr sz="1801" kern="1200">
         <a:solidFill>
           <a:schemeClr val="tx1"/>
         </a:solidFill>
@@ -47,8 +48,8 @@
         <a:cs typeface="+mn-cs"/>
       </a:defRPr>
     </a:lvl3pPr>
-    <a:lvl4pPr marL="1371600" algn="l" defTabSz="914400" rtl="0" eaLnBrk="1" latinLnBrk="0" hangingPunct="1">
-      <a:defRPr sz="1800" kern="1200">
+    <a:lvl4pPr marL="1371578" algn="l" defTabSz="914388" rtl="0" eaLnBrk="1" latinLnBrk="0" hangingPunct="1">
+      <a:defRPr sz="1801" kern="1200">
         <a:solidFill>
           <a:schemeClr val="tx1"/>
         </a:solidFill>
@@ -57,8 +58,8 @@
         <a:cs typeface="+mn-cs"/>
       </a:defRPr>
     </a:lvl4pPr>
-    <a:lvl5pPr marL="1828800" algn="l" defTabSz="914400" rtl="0" eaLnBrk="1" latinLnBrk="0" hangingPunct="1">
-      <a:defRPr sz="1800" kern="1200">
+    <a:lvl5pPr marL="1828772" algn="l" defTabSz="914388" rtl="0" eaLnBrk="1" latinLnBrk="0" hangingPunct="1">
+      <a:defRPr sz="1801" kern="1200">
         <a:solidFill>
           <a:schemeClr val="tx1"/>
         </a:solidFill>
@@ -67,8 +68,8 @@
         <a:cs typeface="+mn-cs"/>
       </a:defRPr>
     </a:lvl5pPr>
-    <a:lvl6pPr marL="2286000" algn="l" defTabSz="914400" rtl="0" eaLnBrk="1" latinLnBrk="0" hangingPunct="1">
-      <a:defRPr sz="1800" kern="1200">
+    <a:lvl6pPr marL="2285966" algn="l" defTabSz="914388" rtl="0" eaLnBrk="1" latinLnBrk="0" hangingPunct="1">
+      <a:defRPr sz="1801" kern="1200">
         <a:solidFill>
           <a:schemeClr val="tx1"/>
         </a:solidFill>
@@ -77,8 +78,8 @@
         <a:cs typeface="+mn-cs"/>
       </a:defRPr>
     </a:lvl6pPr>
-    <a:lvl7pPr marL="2743200" algn="l" defTabSz="914400" rtl="0" eaLnBrk="1" latinLnBrk="0" hangingPunct="1">
-      <a:defRPr sz="1800" kern="1200">
+    <a:lvl7pPr marL="2743160" algn="l" defTabSz="914388" rtl="0" eaLnBrk="1" latinLnBrk="0" hangingPunct="1">
+      <a:defRPr sz="1801" kern="1200">
         <a:solidFill>
           <a:schemeClr val="tx1"/>
         </a:solidFill>
@@ -87,8 +88,8 @@
         <a:cs typeface="+mn-cs"/>
       </a:defRPr>
     </a:lvl7pPr>
-    <a:lvl8pPr marL="3200400" algn="l" defTabSz="914400" rtl="0" eaLnBrk="1" latinLnBrk="0" hangingPunct="1">
-      <a:defRPr sz="1800" kern="1200">
+    <a:lvl8pPr marL="3200353" algn="l" defTabSz="914388" rtl="0" eaLnBrk="1" latinLnBrk="0" hangingPunct="1">
+      <a:defRPr sz="1801" kern="1200">
         <a:solidFill>
           <a:schemeClr val="tx1"/>
         </a:solidFill>
@@ -97,8 +98,8 @@
         <a:cs typeface="+mn-cs"/>
       </a:defRPr>
     </a:lvl8pPr>
-    <a:lvl9pPr marL="3657600" algn="l" defTabSz="914400" rtl="0" eaLnBrk="1" latinLnBrk="0" hangingPunct="1">
-      <a:defRPr sz="1800" kern="1200">
+    <a:lvl9pPr marL="3657544" algn="l" defTabSz="914388" rtl="0" eaLnBrk="1" latinLnBrk="0" hangingPunct="1">
+      <a:defRPr sz="1801" kern="1200">
         <a:solidFill>
           <a:schemeClr val="tx1"/>
         </a:solidFill>
@@ -155,8 +156,8 @@
         </p:nvSpPr>
         <p:spPr>
           <a:xfrm>
-            <a:off x="1524000" y="1122363"/>
-            <a:ext cx="9144000" cy="2387600"/>
+            <a:off x="1524004" y="1122361"/>
+            <a:ext cx="9144000" cy="2387601"/>
           </a:xfrm>
         </p:spPr>
         <p:txBody>
@@ -192,8 +193,8 @@
         </p:nvSpPr>
         <p:spPr>
           <a:xfrm>
-            <a:off x="1524000" y="3602038"/>
-            <a:ext cx="9144000" cy="1655762"/>
+            <a:off x="1524004" y="3602039"/>
+            <a:ext cx="9144000" cy="1655761"/>
           </a:xfrm>
         </p:spPr>
         <p:txBody>
@@ -267,7 +268,7 @@
           <a:p>
             <a:fld id="{0B15CDBD-74C0-41DF-BF4B-4D72E4723E26}" type="datetimeFigureOut">
               <a:rPr lang="en-US" smtClean="0"/>
-              <a:t>24-May-18</a:t>
+              <a:t>25-May-18</a:t>
             </a:fld>
             <a:endParaRPr lang="en-US"/>
           </a:p>
@@ -465,7 +466,7 @@
           <a:p>
             <a:fld id="{0B15CDBD-74C0-41DF-BF4B-4D72E4723E26}" type="datetimeFigureOut">
               <a:rPr lang="en-US" smtClean="0"/>
-              <a:t>24-May-18</a:t>
+              <a:t>25-May-18</a:t>
             </a:fld>
             <a:endParaRPr lang="en-US"/>
           </a:p>
@@ -573,8 +574,8 @@
         </p:nvSpPr>
         <p:spPr>
           <a:xfrm>
-            <a:off x="8724900" y="365125"/>
-            <a:ext cx="2628900" cy="5811838"/>
+            <a:off x="8724901" y="365125"/>
+            <a:ext cx="2628899" cy="5811839"/>
           </a:xfrm>
         </p:spPr>
         <p:txBody>
@@ -607,7 +608,7 @@
         <p:spPr>
           <a:xfrm>
             <a:off x="838200" y="365125"/>
-            <a:ext cx="7734300" cy="5811838"/>
+            <a:ext cx="7734302" cy="5811839"/>
           </a:xfrm>
         </p:spPr>
         <p:txBody>
@@ -673,7 +674,7 @@
           <a:p>
             <a:fld id="{0B15CDBD-74C0-41DF-BF4B-4D72E4723E26}" type="datetimeFigureOut">
               <a:rPr lang="en-US" smtClean="0"/>
-              <a:t>24-May-18</a:t>
+              <a:t>25-May-18</a:t>
             </a:fld>
             <a:endParaRPr lang="en-US"/>
           </a:p>
@@ -871,7 +872,7 @@
           <a:p>
             <a:fld id="{0B15CDBD-74C0-41DF-BF4B-4D72E4723E26}" type="datetimeFigureOut">
               <a:rPr lang="en-US" smtClean="0"/>
-              <a:t>24-May-18</a:t>
+              <a:t>25-May-18</a:t>
             </a:fld>
             <a:endParaRPr lang="en-US"/>
           </a:p>
@@ -979,8 +980,8 @@
         </p:nvSpPr>
         <p:spPr>
           <a:xfrm>
-            <a:off x="831850" y="1709738"/>
-            <a:ext cx="10515600" cy="2852737"/>
+            <a:off x="831854" y="1709738"/>
+            <a:ext cx="10515599" cy="2852737"/>
           </a:xfrm>
         </p:spPr>
         <p:txBody>
@@ -1016,8 +1017,8 @@
         </p:nvSpPr>
         <p:spPr>
           <a:xfrm>
-            <a:off x="831850" y="4589463"/>
-            <a:ext cx="10515600" cy="1500187"/>
+            <a:off x="831854" y="4589464"/>
+            <a:ext cx="10515599" cy="1500186"/>
           </a:xfrm>
         </p:spPr>
         <p:txBody>
@@ -1146,7 +1147,7 @@
           <a:p>
             <a:fld id="{0B15CDBD-74C0-41DF-BF4B-4D72E4723E26}" type="datetimeFigureOut">
               <a:rPr lang="en-US" smtClean="0"/>
-              <a:t>24-May-18</a:t>
+              <a:t>25-May-18</a:t>
             </a:fld>
             <a:endParaRPr lang="en-US"/>
           </a:p>
@@ -1282,7 +1283,7 @@
         </p:nvSpPr>
         <p:spPr>
           <a:xfrm>
-            <a:off x="838200" y="1825625"/>
+            <a:off x="838198" y="1825627"/>
             <a:ext cx="5181600" cy="4351338"/>
           </a:xfrm>
         </p:spPr>
@@ -1344,7 +1345,7 @@
         </p:nvSpPr>
         <p:spPr>
           <a:xfrm>
-            <a:off x="6172200" y="1825625"/>
+            <a:off x="6172202" y="1825627"/>
             <a:ext cx="5181600" cy="4351338"/>
           </a:xfrm>
         </p:spPr>
@@ -1411,7 +1412,7 @@
           <a:p>
             <a:fld id="{0B15CDBD-74C0-41DF-BF4B-4D72E4723E26}" type="datetimeFigureOut">
               <a:rPr lang="en-US" smtClean="0"/>
-              <a:t>24-May-18</a:t>
+              <a:t>25-May-18</a:t>
             </a:fld>
             <a:endParaRPr lang="en-US"/>
           </a:p>
@@ -1519,8 +1520,8 @@
         </p:nvSpPr>
         <p:spPr>
           <a:xfrm>
-            <a:off x="839788" y="365125"/>
-            <a:ext cx="10515600" cy="1325563"/>
+            <a:off x="839793" y="365125"/>
+            <a:ext cx="10515599" cy="1325564"/>
           </a:xfrm>
         </p:spPr>
         <p:txBody>
@@ -1552,8 +1553,8 @@
         </p:nvSpPr>
         <p:spPr>
           <a:xfrm>
-            <a:off x="839788" y="1681163"/>
-            <a:ext cx="5157787" cy="823912"/>
+            <a:off x="839792" y="1681164"/>
+            <a:ext cx="5157788" cy="823911"/>
           </a:xfrm>
         </p:spPr>
         <p:txBody>
@@ -1623,8 +1624,8 @@
         </p:nvSpPr>
         <p:spPr>
           <a:xfrm>
-            <a:off x="839788" y="2505075"/>
-            <a:ext cx="5157787" cy="3684588"/>
+            <a:off x="839792" y="2505078"/>
+            <a:ext cx="5157788" cy="3684587"/>
           </a:xfrm>
         </p:spPr>
         <p:txBody>
@@ -1685,8 +1686,8 @@
         </p:nvSpPr>
         <p:spPr>
           <a:xfrm>
-            <a:off x="6172200" y="1681163"/>
-            <a:ext cx="5183188" cy="823912"/>
+            <a:off x="6172201" y="1681164"/>
+            <a:ext cx="5183188" cy="823911"/>
           </a:xfrm>
         </p:spPr>
         <p:txBody>
@@ -1756,8 +1757,8 @@
         </p:nvSpPr>
         <p:spPr>
           <a:xfrm>
-            <a:off x="6172200" y="2505075"/>
-            <a:ext cx="5183188" cy="3684588"/>
+            <a:off x="6172201" y="2505078"/>
+            <a:ext cx="5183188" cy="3684587"/>
           </a:xfrm>
         </p:spPr>
         <p:txBody>
@@ -1823,7 +1824,7 @@
           <a:p>
             <a:fld id="{0B15CDBD-74C0-41DF-BF4B-4D72E4723E26}" type="datetimeFigureOut">
               <a:rPr lang="en-US" smtClean="0"/>
-              <a:t>24-May-18</a:t>
+              <a:t>25-May-18</a:t>
             </a:fld>
             <a:endParaRPr lang="en-US"/>
           </a:p>
@@ -1964,7 +1965,7 @@
           <a:p>
             <a:fld id="{0B15CDBD-74C0-41DF-BF4B-4D72E4723E26}" type="datetimeFigureOut">
               <a:rPr lang="en-US" smtClean="0"/>
-              <a:t>24-May-18</a:t>
+              <a:t>25-May-18</a:t>
             </a:fld>
             <a:endParaRPr lang="en-US"/>
           </a:p>
@@ -2077,7 +2078,7 @@
           <a:p>
             <a:fld id="{0B15CDBD-74C0-41DF-BF4B-4D72E4723E26}" type="datetimeFigureOut">
               <a:rPr lang="en-US" smtClean="0"/>
-              <a:t>24-May-18</a:t>
+              <a:t>25-May-18</a:t>
             </a:fld>
             <a:endParaRPr lang="en-US"/>
           </a:p>
@@ -2185,8 +2186,8 @@
         </p:nvSpPr>
         <p:spPr>
           <a:xfrm>
-            <a:off x="839788" y="457200"/>
-            <a:ext cx="3932237" cy="1600200"/>
+            <a:off x="839790" y="457199"/>
+            <a:ext cx="3932236" cy="1600200"/>
           </a:xfrm>
         </p:spPr>
         <p:txBody>
@@ -2222,8 +2223,8 @@
         </p:nvSpPr>
         <p:spPr>
           <a:xfrm>
-            <a:off x="5183188" y="987425"/>
-            <a:ext cx="6172200" cy="4873625"/>
+            <a:off x="5183191" y="987426"/>
+            <a:ext cx="6172201" cy="4873625"/>
           </a:xfrm>
         </p:spPr>
         <p:txBody>
@@ -2312,8 +2313,8 @@
         </p:nvSpPr>
         <p:spPr>
           <a:xfrm>
-            <a:off x="839788" y="2057400"/>
-            <a:ext cx="3932237" cy="3811588"/>
+            <a:off x="839790" y="2057400"/>
+            <a:ext cx="3932236" cy="3811589"/>
           </a:xfrm>
         </p:spPr>
         <p:txBody>
@@ -2388,7 +2389,7 @@
           <a:p>
             <a:fld id="{0B15CDBD-74C0-41DF-BF4B-4D72E4723E26}" type="datetimeFigureOut">
               <a:rPr lang="en-US" smtClean="0"/>
-              <a:t>24-May-18</a:t>
+              <a:t>25-May-18</a:t>
             </a:fld>
             <a:endParaRPr lang="en-US"/>
           </a:p>
@@ -2496,8 +2497,8 @@
         </p:nvSpPr>
         <p:spPr>
           <a:xfrm>
-            <a:off x="839788" y="457200"/>
-            <a:ext cx="3932237" cy="1600200"/>
+            <a:off x="839790" y="457199"/>
+            <a:ext cx="3932236" cy="1600200"/>
           </a:xfrm>
         </p:spPr>
         <p:txBody>
@@ -2533,8 +2534,8 @@
         </p:nvSpPr>
         <p:spPr>
           <a:xfrm>
-            <a:off x="5183188" y="987425"/>
-            <a:ext cx="6172200" cy="4873625"/>
+            <a:off x="5183191" y="987426"/>
+            <a:ext cx="6172201" cy="4873625"/>
           </a:xfrm>
         </p:spPr>
         <p:txBody>
@@ -2600,8 +2601,8 @@
         </p:nvSpPr>
         <p:spPr>
           <a:xfrm>
-            <a:off x="839788" y="2057400"/>
-            <a:ext cx="3932237" cy="3811588"/>
+            <a:off x="839790" y="2057400"/>
+            <a:ext cx="3932236" cy="3811589"/>
           </a:xfrm>
         </p:spPr>
         <p:txBody>
@@ -2676,7 +2677,7 @@
           <a:p>
             <a:fld id="{0B15CDBD-74C0-41DF-BF4B-4D72E4723E26}" type="datetimeFigureOut">
               <a:rPr lang="en-US" smtClean="0"/>
-              <a:t>24-May-18</a:t>
+              <a:t>25-May-18</a:t>
             </a:fld>
             <a:endParaRPr lang="en-US"/>
           </a:p>
@@ -2789,8 +2790,8 @@
         </p:nvSpPr>
         <p:spPr>
           <a:xfrm>
-            <a:off x="838200" y="365125"/>
-            <a:ext cx="10515600" cy="1325563"/>
+            <a:off x="838205" y="365125"/>
+            <a:ext cx="10515599" cy="1325564"/>
           </a:xfrm>
           <a:prstGeom prst="rect">
             <a:avLst/>
@@ -2827,8 +2828,8 @@
         </p:nvSpPr>
         <p:spPr>
           <a:xfrm>
-            <a:off x="838200" y="1825625"/>
-            <a:ext cx="10515600" cy="4351338"/>
+            <a:off x="838205" y="1825627"/>
+            <a:ext cx="10515599" cy="4351338"/>
           </a:xfrm>
           <a:prstGeom prst="rect">
             <a:avLst/>
@@ -2894,8 +2895,8 @@
         </p:nvSpPr>
         <p:spPr>
           <a:xfrm>
-            <a:off x="838200" y="6356350"/>
-            <a:ext cx="2743200" cy="365125"/>
+            <a:off x="838202" y="6356350"/>
+            <a:ext cx="2743199" cy="365125"/>
           </a:xfrm>
           <a:prstGeom prst="rect">
             <a:avLst/>
@@ -2917,7 +2918,7 @@
           <a:p>
             <a:fld id="{0B15CDBD-74C0-41DF-BF4B-4D72E4723E26}" type="datetimeFigureOut">
               <a:rPr lang="en-US" smtClean="0"/>
-              <a:t>24-May-18</a:t>
+              <a:t>25-May-18</a:t>
             </a:fld>
             <a:endParaRPr lang="en-US"/>
           </a:p>
@@ -2941,8 +2942,8 @@
         </p:nvSpPr>
         <p:spPr>
           <a:xfrm>
-            <a:off x="4038600" y="6356350"/>
-            <a:ext cx="4114800" cy="365125"/>
+            <a:off x="4038601" y="6356350"/>
+            <a:ext cx="4114798" cy="365125"/>
           </a:xfrm>
           <a:prstGeom prst="rect">
             <a:avLst/>
@@ -2984,8 +2985,8 @@
         </p:nvSpPr>
         <p:spPr>
           <a:xfrm>
-            <a:off x="8610600" y="6356350"/>
-            <a:ext cx="2743200" cy="365125"/>
+            <a:off x="8610599" y="6356350"/>
+            <a:ext cx="2743199" cy="365125"/>
           </a:xfrm>
           <a:prstGeom prst="rect">
             <a:avLst/>
@@ -4480,7 +4481,7 @@
           <p:spPr>
             <a:xfrm>
               <a:off x="9024346" y="2926018"/>
-              <a:ext cx="3282998" cy="369332"/>
+              <a:ext cx="3282998" cy="369460"/>
             </a:xfrm>
             <a:prstGeom prst="rect">
               <a:avLst/>
@@ -6224,7 +6225,7 @@
         </p:nvSpPr>
         <p:spPr>
           <a:xfrm rot="10800000">
-            <a:off x="6439005" y="2357989"/>
+            <a:off x="6439007" y="2357989"/>
             <a:ext cx="154359" cy="175532"/>
           </a:xfrm>
           <a:prstGeom prst="arc">
@@ -6281,7 +6282,7 @@
         </p:nvSpPr>
         <p:spPr>
           <a:xfrm rot="10800000">
-            <a:off x="6246783" y="2318616"/>
+            <a:off x="6246783" y="2318618"/>
             <a:ext cx="369880" cy="397597"/>
           </a:xfrm>
           <a:prstGeom prst="arc">
@@ -6350,7 +6351,7 @@
         </p:nvSpPr>
         <p:spPr>
           <a:xfrm>
-            <a:off x="6439004" y="2533521"/>
+            <a:off x="6439006" y="2533521"/>
             <a:ext cx="177659" cy="182692"/>
           </a:xfrm>
           <a:prstGeom prst="rect">
@@ -6482,7 +6483,7 @@
         </p:nvSpPr>
         <p:spPr>
           <a:xfrm>
-            <a:off x="6422841" y="2487259"/>
+            <a:off x="6422843" y="2487261"/>
             <a:ext cx="55917" cy="55917"/>
           </a:xfrm>
           <a:prstGeom prst="rtTriangle">
@@ -6536,7 +6537,7 @@
         </p:nvSpPr>
         <p:spPr>
           <a:xfrm>
-            <a:off x="6424579" y="2546515"/>
+            <a:off x="6424581" y="2546517"/>
             <a:ext cx="55917" cy="157269"/>
           </a:xfrm>
           <a:prstGeom prst="rect">
@@ -6597,7 +6598,7 @@
         </p:nvSpPr>
         <p:spPr>
           <a:xfrm>
-            <a:off x="6268158" y="2476846"/>
+            <a:off x="6268160" y="2476848"/>
             <a:ext cx="160273" cy="60479"/>
           </a:xfrm>
           <a:prstGeom prst="rect">
@@ -13192,7 +13193,7 @@
         </p:nvSpPr>
         <p:spPr>
           <a:xfrm>
-            <a:off x="4691611" y="2422090"/>
+            <a:off x="4691613" y="2422090"/>
             <a:ext cx="1186675" cy="707886"/>
           </a:xfrm>
           <a:prstGeom prst="rect">
@@ -13233,6 +13234,13 @@
                     <a:lumOff val="50000"/>
                   </a:schemeClr>
                 </a:solidFill>
+                <a:effectLst>
+                  <a:outerShdw blurRad="38100" dist="38100" dir="2700000" algn="tl">
+                    <a:srgbClr val="000000">
+                      <a:alpha val="43137"/>
+                    </a:srgbClr>
+                  </a:outerShdw>
+                </a:effectLst>
               </a:rPr>
               <a:t>CD</a:t>
             </a:r>
@@ -13269,6 +13277,13 @@
           <a:p>
             <a:r>
               <a:rPr lang="en-US" sz="8500" dirty="0">
+                <a:effectLst>
+                  <a:outerShdw blurRad="38100" dist="38100" dir="2700000" algn="tl">
+                    <a:srgbClr val="000000">
+                      <a:alpha val="43137"/>
+                    </a:srgbClr>
+                  </a:outerShdw>
+                </a:effectLst>
                 <a:latin typeface="Avenir 85 Heavy" panose="020B0603020203020204" pitchFamily="34" charset="0"/>
               </a:rPr>
               <a:t>Py</a:t>
@@ -14077,6 +14092,13 @@
                     <a:lumMod val="50000"/>
                   </a:schemeClr>
                 </a:solidFill>
+                <a:effectLst>
+                  <a:outerShdw blurRad="38100" dist="38100" dir="2700000" algn="tl">
+                    <a:srgbClr val="000000">
+                      <a:alpha val="43137"/>
+                    </a:srgbClr>
+                  </a:outerShdw>
+                </a:effectLst>
               </a:rPr>
               <a:t>CD</a:t>
             </a:r>
@@ -14118,6 +14140,13 @@
                     <a:lumMod val="85000"/>
                   </a:schemeClr>
                 </a:solidFill>
+                <a:effectLst>
+                  <a:outerShdw blurRad="38100" dist="38100" dir="2700000" algn="tl">
+                    <a:srgbClr val="000000">
+                      <a:alpha val="43137"/>
+                    </a:srgbClr>
+                  </a:outerShdw>
+                </a:effectLst>
                 <a:latin typeface="Avenir 85 Heavy" panose="020B0603020203020204" pitchFamily="34" charset="0"/>
               </a:rPr>
               <a:t>Py</a:t>
@@ -14139,7 +14168,7 @@
         </p:nvGrpSpPr>
         <p:grpSpPr>
           <a:xfrm>
-            <a:off x="6460947" y="2592951"/>
+            <a:off x="6460947" y="2592953"/>
             <a:ext cx="1482416" cy="1266973"/>
             <a:chOff x="2064532" y="1601640"/>
             <a:chExt cx="1482416" cy="1266973"/>
@@ -14830,7 +14859,7 @@
         <p:spPr>
           <a:xfrm>
             <a:off x="3079847" y="5324030"/>
-            <a:ext cx="5542860" cy="369332"/>
+            <a:ext cx="5542860" cy="369460"/>
           </a:xfrm>
           <a:prstGeom prst="rect">
             <a:avLst/>
@@ -14951,7 +14980,7 @@
         </p:nvSpPr>
         <p:spPr>
           <a:xfrm>
-            <a:off x="4691611" y="2422090"/>
+            <a:off x="4691613" y="2422090"/>
             <a:ext cx="1186675" cy="707886"/>
           </a:xfrm>
           <a:prstGeom prst="rect">
@@ -14992,6 +15021,13 @@
                     <a:lumOff val="50000"/>
                   </a:schemeClr>
                 </a:solidFill>
+                <a:effectLst>
+                  <a:outerShdw blurRad="38100" dist="38100" dir="2700000" algn="tl">
+                    <a:srgbClr val="000000">
+                      <a:alpha val="43137"/>
+                    </a:srgbClr>
+                  </a:outerShdw>
+                </a:effectLst>
               </a:rPr>
               <a:t>CD</a:t>
             </a:r>
@@ -15028,6 +15064,13 @@
           <a:p>
             <a:r>
               <a:rPr lang="en-US" sz="8500" dirty="0">
+                <a:effectLst>
+                  <a:outerShdw blurRad="38100" dist="38100" dir="2700000" algn="tl">
+                    <a:srgbClr val="000000">
+                      <a:alpha val="43137"/>
+                    </a:srgbClr>
+                  </a:outerShdw>
+                </a:effectLst>
                 <a:latin typeface="Avenir 85 Heavy" panose="020B0603020203020204" pitchFamily="34" charset="0"/>
               </a:rPr>
               <a:t>Py</a:t>
@@ -15889,6 +15932,13 @@
                     <a:lumMod val="50000"/>
                   </a:schemeClr>
                 </a:solidFill>
+                <a:effectLst>
+                  <a:outerShdw blurRad="38100" dist="38100" dir="2700000" algn="tl">
+                    <a:srgbClr val="000000">
+                      <a:alpha val="43137"/>
+                    </a:srgbClr>
+                  </a:outerShdw>
+                </a:effectLst>
               </a:rPr>
               <a:t>CD</a:t>
             </a:r>
@@ -15930,6 +15980,13 @@
                     <a:lumMod val="85000"/>
                   </a:schemeClr>
                 </a:solidFill>
+                <a:effectLst>
+                  <a:outerShdw blurRad="38100" dist="38100" dir="2700000" algn="tl">
+                    <a:srgbClr val="000000">
+                      <a:alpha val="43137"/>
+                    </a:srgbClr>
+                  </a:outerShdw>
+                </a:effectLst>
                 <a:latin typeface="Avenir 85 Heavy" panose="020B0603020203020204" pitchFamily="34" charset="0"/>
               </a:rPr>
               <a:t>Py</a:t>
@@ -15951,7 +16008,7 @@
         </p:nvSpPr>
         <p:spPr>
           <a:xfrm rot="5400000">
-            <a:off x="6189365" y="3117263"/>
+            <a:off x="6189367" y="3117263"/>
             <a:ext cx="1229037" cy="192220"/>
           </a:xfrm>
           <a:prstGeom prst="rect">
@@ -16017,7 +16074,7 @@
         </p:nvSpPr>
         <p:spPr>
           <a:xfrm rot="5400000">
-            <a:off x="7060175" y="3038629"/>
+            <a:off x="7060177" y="3038631"/>
             <a:ext cx="1071767" cy="192221"/>
           </a:xfrm>
           <a:prstGeom prst="rect">
@@ -16206,7 +16263,7 @@
         </p:nvSpPr>
         <p:spPr>
           <a:xfrm rot="10800000">
-            <a:off x="7499948" y="3462327"/>
+            <a:off x="7499948" y="3462329"/>
             <a:ext cx="369880" cy="397597"/>
           </a:xfrm>
           <a:prstGeom prst="arc">
@@ -16341,7 +16398,7 @@
         </p:nvSpPr>
         <p:spPr>
           <a:xfrm>
-            <a:off x="6576717" y="2937612"/>
+            <a:off x="6576719" y="2937612"/>
             <a:ext cx="1250877" cy="192220"/>
           </a:xfrm>
           <a:prstGeom prst="rect">
@@ -16522,7 +16579,7 @@
         </p:nvSpPr>
         <p:spPr>
           <a:xfrm>
-            <a:off x="7521323" y="3620557"/>
+            <a:off x="7521325" y="3620559"/>
             <a:ext cx="160273" cy="60479"/>
           </a:xfrm>
           <a:prstGeom prst="rect">
@@ -16633,7 +16690,7 @@
         </p:nvSpPr>
         <p:spPr>
           <a:xfrm rot="5400000">
-            <a:off x="7141205" y="2782812"/>
+            <a:off x="7141207" y="2782814"/>
             <a:ext cx="152441" cy="157163"/>
           </a:xfrm>
           <a:prstGeom prst="rect">
@@ -16695,7 +16752,7 @@
         <p:spPr>
           <a:xfrm>
             <a:off x="3079847" y="5324030"/>
-            <a:ext cx="5542860" cy="369332"/>
+            <a:ext cx="5542860" cy="369460"/>
           </a:xfrm>
           <a:prstGeom prst="rect">
             <a:avLst/>
@@ -16857,6 +16914,13 @@
                     <a:lumMod val="50000"/>
                   </a:schemeClr>
                 </a:solidFill>
+                <a:effectLst>
+                  <a:outerShdw blurRad="38100" dist="38100" dir="2700000" algn="tl">
+                    <a:srgbClr val="000000">
+                      <a:alpha val="43137"/>
+                    </a:srgbClr>
+                  </a:outerShdw>
+                </a:effectLst>
               </a:rPr>
               <a:t>CD</a:t>
             </a:r>
@@ -16898,6 +16962,13 @@
                     <a:lumMod val="85000"/>
                   </a:schemeClr>
                 </a:solidFill>
+                <a:effectLst>
+                  <a:outerShdw blurRad="38100" dist="38100" dir="2700000" algn="tl">
+                    <a:srgbClr val="000000">
+                      <a:alpha val="43137"/>
+                    </a:srgbClr>
+                  </a:outerShdw>
+                </a:effectLst>
                 <a:latin typeface="Avenir 85 Heavy" panose="020B0603020203020204" pitchFamily="34" charset="0"/>
               </a:rPr>
               <a:t>Py</a:t>
@@ -16919,7 +16990,7 @@
         </p:nvSpPr>
         <p:spPr>
           <a:xfrm rot="5400000">
-            <a:off x="6190237" y="3117263"/>
+            <a:off x="6191232" y="3112350"/>
             <a:ext cx="1229037" cy="192220"/>
           </a:xfrm>
           <a:prstGeom prst="rect">
@@ -16928,7 +16999,7 @@
           <a:solidFill>
             <a:srgbClr val="FF3300"/>
           </a:solidFill>
-          <a:ln>
+          <a:ln w="19050">
             <a:solidFill>
               <a:schemeClr val="tx1"/>
             </a:solidFill>
@@ -16985,7 +17056,7 @@
         </p:nvSpPr>
         <p:spPr>
           <a:xfrm rot="5400000">
-            <a:off x="7060245" y="3039431"/>
+            <a:off x="7061240" y="3034518"/>
             <a:ext cx="1071767" cy="190618"/>
           </a:xfrm>
           <a:prstGeom prst="rect">
@@ -16994,7 +17065,7 @@
           <a:solidFill>
             <a:srgbClr val="FF3300"/>
           </a:solidFill>
-          <a:ln>
+          <a:ln w="19050">
             <a:solidFill>
               <a:schemeClr val="tx1"/>
             </a:solidFill>
@@ -17051,7 +17122,7 @@
         </p:nvSpPr>
         <p:spPr>
           <a:xfrm rot="10800000">
-            <a:off x="7693042" y="3501700"/>
+            <a:off x="7694035" y="3496787"/>
             <a:ext cx="154359" cy="175532"/>
           </a:xfrm>
           <a:prstGeom prst="arc">
@@ -17061,7 +17132,7 @@
             </a:avLst>
           </a:prstGeom>
           <a:noFill/>
-          <a:ln w="12700">
+          <a:ln w="19050">
             <a:solidFill>
               <a:schemeClr val="tx1"/>
             </a:solidFill>
@@ -17108,7 +17179,7 @@
         </p:nvSpPr>
         <p:spPr>
           <a:xfrm rot="10800000">
-            <a:off x="7500820" y="3462327"/>
+            <a:off x="7501813" y="3457416"/>
             <a:ext cx="369880" cy="397597"/>
           </a:xfrm>
           <a:prstGeom prst="arc">
@@ -17120,7 +17191,7 @@
           <a:solidFill>
             <a:srgbClr val="FF3300"/>
           </a:solidFill>
-          <a:ln>
+          <a:ln w="19050">
             <a:solidFill>
               <a:schemeClr val="tx1"/>
             </a:solidFill>
@@ -17177,7 +17248,7 @@
         </p:nvSpPr>
         <p:spPr>
           <a:xfrm>
-            <a:off x="7693041" y="3677232"/>
+            <a:off x="7694034" y="3672319"/>
             <a:ext cx="177659" cy="182692"/>
           </a:xfrm>
           <a:prstGeom prst="rect">
@@ -17186,7 +17257,7 @@
           <a:solidFill>
             <a:srgbClr val="FF3300"/>
           </a:solidFill>
-          <a:ln>
+          <a:ln w="19050">
             <a:solidFill>
               <a:schemeClr val="tx1"/>
             </a:solidFill>
@@ -17243,7 +17314,7 @@
         </p:nvSpPr>
         <p:spPr>
           <a:xfrm>
-            <a:off x="6577589" y="2937612"/>
+            <a:off x="6578584" y="2932699"/>
             <a:ext cx="1250877" cy="192220"/>
           </a:xfrm>
           <a:prstGeom prst="rect">
@@ -17252,7 +17323,7 @@
           <a:solidFill>
             <a:srgbClr val="FF3300"/>
           </a:solidFill>
-          <a:ln>
+          <a:ln w="19050">
             <a:solidFill>
               <a:schemeClr val="tx1"/>
             </a:solidFill>
@@ -17309,7 +17380,7 @@
         </p:nvSpPr>
         <p:spPr>
           <a:xfrm>
-            <a:off x="7676878" y="3630970"/>
+            <a:off x="7677871" y="3626057"/>
             <a:ext cx="55917" cy="55917"/>
           </a:xfrm>
           <a:prstGeom prst="rtTriangle">
@@ -17318,7 +17389,7 @@
           <a:solidFill>
             <a:srgbClr val="FF3300"/>
           </a:solidFill>
-          <a:ln>
+          <a:ln w="19050">
             <a:solidFill>
               <a:srgbClr val="FF0000"/>
             </a:solidFill>
@@ -17363,7 +17434,7 @@
         </p:nvSpPr>
         <p:spPr>
           <a:xfrm>
-            <a:off x="7678616" y="3690226"/>
+            <a:off x="7679609" y="3678963"/>
             <a:ext cx="55917" cy="157269"/>
           </a:xfrm>
           <a:prstGeom prst="rect">
@@ -17372,7 +17443,7 @@
           <a:solidFill>
             <a:srgbClr val="FF3300"/>
           </a:solidFill>
-          <a:ln>
+          <a:ln w="19050">
             <a:solidFill>
               <a:srgbClr val="FF3300"/>
             </a:solidFill>
@@ -17424,7 +17495,7 @@
         </p:nvSpPr>
         <p:spPr>
           <a:xfrm>
-            <a:off x="7522195" y="3620557"/>
+            <a:off x="7525001" y="3644274"/>
             <a:ext cx="160273" cy="60479"/>
           </a:xfrm>
           <a:prstGeom prst="rect">
@@ -17433,7 +17504,7 @@
           <a:solidFill>
             <a:srgbClr val="FF3300"/>
           </a:solidFill>
-          <a:ln>
+          <a:ln w="19050">
             <a:solidFill>
               <a:srgbClr val="FF3300"/>
             </a:solidFill>
@@ -17478,17 +17549,17 @@
         </p:nvSpPr>
         <p:spPr>
           <a:xfrm rot="10800000">
-            <a:off x="7682150" y="3501699"/>
+            <a:off x="7677604" y="3511103"/>
             <a:ext cx="176376" cy="185188"/>
           </a:xfrm>
           <a:prstGeom prst="arc">
             <a:avLst>
               <a:gd name="adj1" fmla="val 15927728"/>
-              <a:gd name="adj2" fmla="val 21465054"/>
+              <a:gd name="adj2" fmla="val 21212189"/>
             </a:avLst>
           </a:prstGeom>
           <a:noFill/>
-          <a:ln w="12700">
+          <a:ln w="19050">
             <a:solidFill>
               <a:srgbClr val="FF3300"/>
             </a:solidFill>
@@ -17591,7 +17662,7 @@
         </p:nvSpPr>
         <p:spPr>
           <a:xfrm>
-            <a:off x="4691611" y="2422090"/>
+            <a:off x="4691613" y="2422090"/>
             <a:ext cx="1186675" cy="707886"/>
           </a:xfrm>
           <a:prstGeom prst="rect">
@@ -17632,6 +17703,13 @@
                     <a:lumOff val="50000"/>
                   </a:schemeClr>
                 </a:solidFill>
+                <a:effectLst>
+                  <a:outerShdw blurRad="38100" dist="38100" dir="2700000" algn="tl">
+                    <a:srgbClr val="000000">
+                      <a:alpha val="43137"/>
+                    </a:srgbClr>
+                  </a:outerShdw>
+                </a:effectLst>
               </a:rPr>
               <a:t>CD</a:t>
             </a:r>
@@ -17668,6 +17746,13 @@
           <a:p>
             <a:r>
               <a:rPr lang="en-US" sz="8500" dirty="0">
+                <a:effectLst>
+                  <a:outerShdw blurRad="38100" dist="38100" dir="2700000" algn="tl">
+                    <a:srgbClr val="000000">
+                      <a:alpha val="43137"/>
+                    </a:srgbClr>
+                  </a:outerShdw>
+                </a:effectLst>
                 <a:latin typeface="Avenir 85 Heavy" panose="020B0603020203020204" pitchFamily="34" charset="0"/>
               </a:rPr>
               <a:t>Py</a:t>
@@ -17677,10 +17762,10 @@
       </p:sp>
       <p:sp>
         <p:nvSpPr>
-          <p:cNvPr id="78" name="Rectangle 77">
-            <a:extLst>
-              <a:ext uri="{FF2B5EF4-FFF2-40B4-BE49-F238E27FC236}">
-                <a16:creationId xmlns:a16="http://schemas.microsoft.com/office/drawing/2014/main" id="{39BF69B4-DDAD-474E-AA1A-8286BEA43B30}"/>
+          <p:cNvPr id="88" name="Rectangle 87">
+            <a:extLst>
+              <a:ext uri="{FF2B5EF4-FFF2-40B4-BE49-F238E27FC236}">
+                <a16:creationId xmlns:a16="http://schemas.microsoft.com/office/drawing/2014/main" id="{F1587A8E-8E12-4DB2-B0A4-6FD1A52DD425}"/>
               </a:ext>
             </a:extLst>
           </p:cNvPr>
@@ -17689,8 +17774,8 @@
         </p:nvSpPr>
         <p:spPr>
           <a:xfrm rot="5400000">
-            <a:off x="2938086" y="3117263"/>
-            <a:ext cx="1229037" cy="192220"/>
+            <a:off x="7143072" y="2777901"/>
+            <a:ext cx="152441" cy="157163"/>
           </a:xfrm>
           <a:prstGeom prst="rect">
             <a:avLst/>
@@ -17698,7 +17783,312 @@
           <a:solidFill>
             <a:srgbClr val="FF3300"/>
           </a:solidFill>
-          <a:ln>
+          <a:ln w="19050">
+            <a:solidFill>
+              <a:schemeClr val="tx1"/>
+            </a:solidFill>
+          </a:ln>
+          <a:effectLst>
+            <a:softEdge rad="0"/>
+          </a:effectLst>
+        </p:spPr>
+        <p:style>
+          <a:lnRef idx="2">
+            <a:schemeClr val="accent1">
+              <a:shade val="50000"/>
+            </a:schemeClr>
+          </a:lnRef>
+          <a:fillRef idx="1">
+            <a:schemeClr val="accent1"/>
+          </a:fillRef>
+          <a:effectRef idx="0">
+            <a:schemeClr val="accent1"/>
+          </a:effectRef>
+          <a:fontRef idx="minor">
+            <a:schemeClr val="lt1"/>
+          </a:fontRef>
+        </p:style>
+        <p:txBody>
+          <a:bodyPr rtlCol="0" anchor="ctr"/>
+          <a:lstStyle/>
+          <a:p>
+            <a:pPr algn="ctr"/>
+            <a:endParaRPr lang="en-US">
+              <a:solidFill>
+                <a:srgbClr val="FF0000"/>
+              </a:solidFill>
+            </a:endParaRPr>
+          </a:p>
+        </p:txBody>
+      </p:sp>
+      <p:sp>
+        <p:nvSpPr>
+          <p:cNvPr id="91" name="Flowchart: Manual Input 90">
+            <a:extLst>
+              <a:ext uri="{FF2B5EF4-FFF2-40B4-BE49-F238E27FC236}">
+                <a16:creationId xmlns:a16="http://schemas.microsoft.com/office/drawing/2014/main" id="{596BE511-5991-4106-950B-672CA5B13121}"/>
+              </a:ext>
+            </a:extLst>
+          </p:cNvPr>
+          <p:cNvSpPr/>
+          <p:nvPr/>
+        </p:nvSpPr>
+        <p:spPr>
+          <a:xfrm rot="16200000">
+            <a:off x="6726731" y="2327059"/>
+            <a:ext cx="192924" cy="720727"/>
+          </a:xfrm>
+          <a:prstGeom prst="flowChartManualInput">
+            <a:avLst/>
+          </a:prstGeom>
+          <a:solidFill>
+            <a:srgbClr val="FF3300"/>
+          </a:solidFill>
+          <a:ln w="19050">
+            <a:solidFill>
+              <a:schemeClr val="tx1"/>
+            </a:solidFill>
+          </a:ln>
+          <a:effectLst>
+            <a:outerShdw blurRad="25400" dist="50800" dir="3960000" sx="81000" sy="81000" algn="ctr" rotWithShape="0">
+              <a:srgbClr val="000000">
+                <a:alpha val="17000"/>
+              </a:srgbClr>
+            </a:outerShdw>
+            <a:softEdge rad="0"/>
+          </a:effectLst>
+        </p:spPr>
+        <p:style>
+          <a:lnRef idx="2">
+            <a:schemeClr val="accent1">
+              <a:shade val="50000"/>
+            </a:schemeClr>
+          </a:lnRef>
+          <a:fillRef idx="1">
+            <a:schemeClr val="accent1"/>
+          </a:fillRef>
+          <a:effectRef idx="0">
+            <a:schemeClr val="accent1"/>
+          </a:effectRef>
+          <a:fontRef idx="minor">
+            <a:schemeClr val="lt1"/>
+          </a:fontRef>
+        </p:style>
+        <p:txBody>
+          <a:bodyPr rot="0" spcFirstLastPara="0" vertOverflow="overflow" horzOverflow="overflow" vert="horz" wrap="square" lIns="91440" tIns="45720" rIns="91440" bIns="45720" numCol="1" spcCol="0" rtlCol="0" fromWordArt="0" anchor="ctr" anchorCtr="0" forceAA="0" compatLnSpc="1">
+            <a:prstTxWarp prst="textNoShape">
+              <a:avLst/>
+            </a:prstTxWarp>
+            <a:noAutofit/>
+          </a:bodyPr>
+          <a:lstStyle/>
+          <a:p>
+            <a:pPr algn="ctr"/>
+            <a:endParaRPr lang="en-US">
+              <a:solidFill>
+                <a:srgbClr val="FF0000"/>
+              </a:solidFill>
+            </a:endParaRPr>
+          </a:p>
+        </p:txBody>
+      </p:sp>
+      <p:sp>
+        <p:nvSpPr>
+          <p:cNvPr id="92" name="Flowchart: Manual Input 91">
+            <a:extLst>
+              <a:ext uri="{FF2B5EF4-FFF2-40B4-BE49-F238E27FC236}">
+                <a16:creationId xmlns:a16="http://schemas.microsoft.com/office/drawing/2014/main" id="{964449BE-2B2E-43A2-915B-4AE5F260C543}"/>
+              </a:ext>
+            </a:extLst>
+          </p:cNvPr>
+          <p:cNvSpPr/>
+          <p:nvPr/>
+        </p:nvSpPr>
+        <p:spPr>
+          <a:xfrm rot="16200000" flipV="1">
+            <a:off x="7473407" y="2301109"/>
+            <a:ext cx="192924" cy="772624"/>
+          </a:xfrm>
+          <a:prstGeom prst="flowChartManualInput">
+            <a:avLst/>
+          </a:prstGeom>
+          <a:solidFill>
+            <a:srgbClr val="FF3300"/>
+          </a:solidFill>
+          <a:ln w="19050">
+            <a:solidFill>
+              <a:schemeClr val="tx1"/>
+            </a:solidFill>
+          </a:ln>
+          <a:effectLst>
+            <a:outerShdw blurRad="25400" dist="50800" dir="3960000" sx="81000" sy="81000" algn="ctr" rotWithShape="0">
+              <a:srgbClr val="000000">
+                <a:alpha val="17000"/>
+              </a:srgbClr>
+            </a:outerShdw>
+            <a:softEdge rad="0"/>
+          </a:effectLst>
+        </p:spPr>
+        <p:style>
+          <a:lnRef idx="2">
+            <a:schemeClr val="accent1">
+              <a:shade val="50000"/>
+            </a:schemeClr>
+          </a:lnRef>
+          <a:fillRef idx="1">
+            <a:schemeClr val="accent1"/>
+          </a:fillRef>
+          <a:effectRef idx="0">
+            <a:schemeClr val="accent1"/>
+          </a:effectRef>
+          <a:fontRef idx="minor">
+            <a:schemeClr val="lt1"/>
+          </a:fontRef>
+        </p:style>
+        <p:txBody>
+          <a:bodyPr rot="0" spcFirstLastPara="0" vertOverflow="overflow" horzOverflow="overflow" vert="horz" wrap="square" lIns="91440" tIns="45720" rIns="91440" bIns="45720" numCol="1" spcCol="0" rtlCol="0" fromWordArt="0" anchor="ctr" anchorCtr="0" forceAA="0" compatLnSpc="1">
+            <a:prstTxWarp prst="textNoShape">
+              <a:avLst/>
+            </a:prstTxWarp>
+            <a:noAutofit/>
+          </a:bodyPr>
+          <a:lstStyle/>
+          <a:p>
+            <a:pPr algn="ctr"/>
+            <a:endParaRPr lang="en-US">
+              <a:solidFill>
+                <a:srgbClr val="FF0000"/>
+              </a:solidFill>
+            </a:endParaRPr>
+          </a:p>
+        </p:txBody>
+      </p:sp>
+      <p:sp>
+        <p:nvSpPr>
+          <p:cNvPr id="93" name="Flowchart: Process 92">
+            <a:extLst>
+              <a:ext uri="{FF2B5EF4-FFF2-40B4-BE49-F238E27FC236}">
+                <a16:creationId xmlns:a16="http://schemas.microsoft.com/office/drawing/2014/main" id="{15A917B5-7B34-4190-A6C2-5DC3A64DDD42}"/>
+              </a:ext>
+            </a:extLst>
+          </p:cNvPr>
+          <p:cNvSpPr/>
+          <p:nvPr/>
+        </p:nvSpPr>
+        <p:spPr>
+          <a:xfrm>
+            <a:off x="7140711" y="2611061"/>
+            <a:ext cx="117475" cy="152721"/>
+          </a:xfrm>
+          <a:prstGeom prst="flowChartProcess">
+            <a:avLst/>
+          </a:prstGeom>
+          <a:solidFill>
+            <a:srgbClr val="FF3300"/>
+          </a:solidFill>
+          <a:ln w="19050">
+            <a:solidFill>
+              <a:srgbClr val="FF3300"/>
+            </a:solidFill>
+          </a:ln>
+          <a:effectLst>
+            <a:softEdge rad="0"/>
+          </a:effectLst>
+        </p:spPr>
+        <p:style>
+          <a:lnRef idx="2">
+            <a:schemeClr val="accent1">
+              <a:shade val="50000"/>
+            </a:schemeClr>
+          </a:lnRef>
+          <a:fillRef idx="1">
+            <a:schemeClr val="accent1"/>
+          </a:fillRef>
+          <a:effectRef idx="0">
+            <a:schemeClr val="accent1"/>
+          </a:effectRef>
+          <a:fontRef idx="minor">
+            <a:schemeClr val="lt1"/>
+          </a:fontRef>
+        </p:style>
+        <p:txBody>
+          <a:bodyPr rot="0" spcFirstLastPara="0" vertOverflow="overflow" horzOverflow="overflow" vert="horz" wrap="square" lIns="91440" tIns="45720" rIns="91440" bIns="45720" numCol="1" spcCol="0" rtlCol="0" fromWordArt="0" anchor="ctr" anchorCtr="0" forceAA="0" compatLnSpc="1">
+            <a:prstTxWarp prst="textNoShape">
+              <a:avLst/>
+            </a:prstTxWarp>
+            <a:noAutofit/>
+          </a:bodyPr>
+          <a:lstStyle/>
+          <a:p>
+            <a:pPr algn="ctr"/>
+            <a:endParaRPr lang="en-US">
+              <a:solidFill>
+                <a:srgbClr val="FF0000"/>
+              </a:solidFill>
+            </a:endParaRPr>
+          </a:p>
+        </p:txBody>
+      </p:sp>
+      <p:sp>
+        <p:nvSpPr>
+          <p:cNvPr id="99" name="TextBox 98">
+            <a:extLst>
+              <a:ext uri="{FF2B5EF4-FFF2-40B4-BE49-F238E27FC236}">
+                <a16:creationId xmlns:a16="http://schemas.microsoft.com/office/drawing/2014/main" id="{1BC5A820-1A8E-4B18-BCCD-D559E1F37E05}"/>
+              </a:ext>
+            </a:extLst>
+          </p:cNvPr>
+          <p:cNvSpPr txBox="1"/>
+          <p:nvPr/>
+        </p:nvSpPr>
+        <p:spPr>
+          <a:xfrm>
+            <a:off x="3079847" y="5324030"/>
+            <a:ext cx="5542860" cy="369460"/>
+          </a:xfrm>
+          <a:prstGeom prst="rect">
+            <a:avLst/>
+          </a:prstGeom>
+          <a:noFill/>
+        </p:spPr>
+        <p:txBody>
+          <a:bodyPr wrap="square" rtlCol="0">
+            <a:spAutoFit/>
+          </a:bodyPr>
+          <a:lstStyle/>
+          <a:p>
+            <a:r>
+              <a:rPr lang="pt-BR" dirty="0"/>
+              <a:t>VERSAO FINAL - MANTER</a:t>
+            </a:r>
+            <a:endParaRPr lang="en-US" dirty="0"/>
+          </a:p>
+        </p:txBody>
+      </p:sp>
+      <p:sp>
+        <p:nvSpPr>
+          <p:cNvPr id="39" name="Rectangle 38">
+            <a:extLst>
+              <a:ext uri="{FF2B5EF4-FFF2-40B4-BE49-F238E27FC236}">
+                <a16:creationId xmlns:a16="http://schemas.microsoft.com/office/drawing/2014/main" id="{4C851764-B5B5-4140-8729-537DBFCC4AFE}"/>
+              </a:ext>
+            </a:extLst>
+          </p:cNvPr>
+          <p:cNvSpPr/>
+          <p:nvPr/>
+        </p:nvSpPr>
+        <p:spPr>
+          <a:xfrm rot="5400000">
+            <a:off x="2931699" y="3117264"/>
+            <a:ext cx="1229037" cy="192220"/>
+          </a:xfrm>
+          <a:prstGeom prst="rect">
+            <a:avLst/>
+          </a:prstGeom>
+          <a:solidFill>
+            <a:srgbClr val="FF3300"/>
+          </a:solidFill>
+          <a:ln w="19050">
             <a:solidFill>
               <a:schemeClr val="tx1"/>
             </a:solidFill>
@@ -17743,10 +18133,10 @@
       </p:sp>
       <p:sp>
         <p:nvSpPr>
-          <p:cNvPr id="79" name="Rectangle 78">
-            <a:extLst>
-              <a:ext uri="{FF2B5EF4-FFF2-40B4-BE49-F238E27FC236}">
-                <a16:creationId xmlns:a16="http://schemas.microsoft.com/office/drawing/2014/main" id="{6DE66076-A071-48BB-A14E-4B7F6DD78982}"/>
+          <p:cNvPr id="40" name="Rectangle 39">
+            <a:extLst>
+              <a:ext uri="{FF2B5EF4-FFF2-40B4-BE49-F238E27FC236}">
+                <a16:creationId xmlns:a16="http://schemas.microsoft.com/office/drawing/2014/main" id="{D073F936-2CDE-4F6B-B3C9-80334891D977}"/>
               </a:ext>
             </a:extLst>
           </p:cNvPr>
@@ -17755,8 +18145,8 @@
         </p:nvSpPr>
         <p:spPr>
           <a:xfrm rot="5400000">
-            <a:off x="3808896" y="3038629"/>
-            <a:ext cx="1071767" cy="192221"/>
+            <a:off x="3801707" y="3039432"/>
+            <a:ext cx="1071767" cy="190618"/>
           </a:xfrm>
           <a:prstGeom prst="rect">
             <a:avLst/>
@@ -17764,7 +18154,7 @@
           <a:solidFill>
             <a:srgbClr val="FF3300"/>
           </a:solidFill>
-          <a:ln>
+          <a:ln w="19050">
             <a:solidFill>
               <a:schemeClr val="tx1"/>
             </a:solidFill>
@@ -17809,10 +18199,10 @@
       </p:sp>
       <p:sp>
         <p:nvSpPr>
-          <p:cNvPr id="80" name="Arc 79">
-            <a:extLst>
-              <a:ext uri="{FF2B5EF4-FFF2-40B4-BE49-F238E27FC236}">
-                <a16:creationId xmlns:a16="http://schemas.microsoft.com/office/drawing/2014/main" id="{F7F0D638-BBC2-4F88-8350-D2B801DA5FD1}"/>
+          <p:cNvPr id="41" name="Arc 40">
+            <a:extLst>
+              <a:ext uri="{FF2B5EF4-FFF2-40B4-BE49-F238E27FC236}">
+                <a16:creationId xmlns:a16="http://schemas.microsoft.com/office/drawing/2014/main" id="{085C7508-6F78-4430-9FD4-69DDCFDEE324}"/>
               </a:ext>
             </a:extLst>
           </p:cNvPr>
@@ -17821,7 +18211,7 @@
         </p:nvSpPr>
         <p:spPr>
           <a:xfrm rot="10800000">
-            <a:off x="4440891" y="3501700"/>
+            <a:off x="4434504" y="3501701"/>
             <a:ext cx="154359" cy="175532"/>
           </a:xfrm>
           <a:prstGeom prst="arc">
@@ -17831,7 +18221,7 @@
             </a:avLst>
           </a:prstGeom>
           <a:noFill/>
-          <a:ln w="12700">
+          <a:ln w="19050">
             <a:solidFill>
               <a:schemeClr val="tx1"/>
             </a:solidFill>
@@ -17866,10 +18256,10 @@
       </p:sp>
       <p:sp>
         <p:nvSpPr>
-          <p:cNvPr id="81" name="Arc 80">
-            <a:extLst>
-              <a:ext uri="{FF2B5EF4-FFF2-40B4-BE49-F238E27FC236}">
-                <a16:creationId xmlns:a16="http://schemas.microsoft.com/office/drawing/2014/main" id="{65518516-FC57-4EEA-AE0A-08F8D6FCBB9C}"/>
+          <p:cNvPr id="42" name="Arc 41">
+            <a:extLst>
+              <a:ext uri="{FF2B5EF4-FFF2-40B4-BE49-F238E27FC236}">
+                <a16:creationId xmlns:a16="http://schemas.microsoft.com/office/drawing/2014/main" id="{78004CD0-E876-4523-A657-EF804B8189B9}"/>
               </a:ext>
             </a:extLst>
           </p:cNvPr>
@@ -17878,7 +18268,7 @@
         </p:nvSpPr>
         <p:spPr>
           <a:xfrm rot="10800000">
-            <a:off x="4248669" y="3462327"/>
+            <a:off x="4242282" y="3462328"/>
             <a:ext cx="369880" cy="397597"/>
           </a:xfrm>
           <a:prstGeom prst="arc">
@@ -17890,7 +18280,7 @@
           <a:solidFill>
             <a:srgbClr val="FF3300"/>
           </a:solidFill>
-          <a:ln>
+          <a:ln w="19050">
             <a:solidFill>
               <a:schemeClr val="tx1"/>
             </a:solidFill>
@@ -17935,10 +18325,10 @@
       </p:sp>
       <p:sp>
         <p:nvSpPr>
-          <p:cNvPr id="82" name="Rectangle 81">
-            <a:extLst>
-              <a:ext uri="{FF2B5EF4-FFF2-40B4-BE49-F238E27FC236}">
-                <a16:creationId xmlns:a16="http://schemas.microsoft.com/office/drawing/2014/main" id="{53CDA243-623A-4842-B662-D11A55D77BE8}"/>
+          <p:cNvPr id="43" name="Rectangle 42">
+            <a:extLst>
+              <a:ext uri="{FF2B5EF4-FFF2-40B4-BE49-F238E27FC236}">
+                <a16:creationId xmlns:a16="http://schemas.microsoft.com/office/drawing/2014/main" id="{6CCA5892-1CF5-4B20-BC1F-126C527F73CC}"/>
               </a:ext>
             </a:extLst>
           </p:cNvPr>
@@ -17947,7 +18337,7 @@
         </p:nvSpPr>
         <p:spPr>
           <a:xfrm>
-            <a:off x="4440890" y="3677232"/>
+            <a:off x="4434503" y="3677233"/>
             <a:ext cx="177659" cy="182692"/>
           </a:xfrm>
           <a:prstGeom prst="rect">
@@ -17956,7 +18346,7 @@
           <a:solidFill>
             <a:srgbClr val="FF3300"/>
           </a:solidFill>
-          <a:ln>
+          <a:ln w="19050">
             <a:solidFill>
               <a:schemeClr val="tx1"/>
             </a:solidFill>
@@ -18001,10 +18391,10 @@
       </p:sp>
       <p:sp>
         <p:nvSpPr>
-          <p:cNvPr id="83" name="Rectangle 82">
-            <a:extLst>
-              <a:ext uri="{FF2B5EF4-FFF2-40B4-BE49-F238E27FC236}">
-                <a16:creationId xmlns:a16="http://schemas.microsoft.com/office/drawing/2014/main" id="{3FB791C3-1AE9-443E-8BE1-8E42BAEFFE71}"/>
+          <p:cNvPr id="44" name="Rectangle 43">
+            <a:extLst>
+              <a:ext uri="{FF2B5EF4-FFF2-40B4-BE49-F238E27FC236}">
+                <a16:creationId xmlns:a16="http://schemas.microsoft.com/office/drawing/2014/main" id="{346CB2A5-AD49-4401-9C7C-353DA765562D}"/>
               </a:ext>
             </a:extLst>
           </p:cNvPr>
@@ -18013,7 +18403,7 @@
         </p:nvSpPr>
         <p:spPr>
           <a:xfrm>
-            <a:off x="3325438" y="2937612"/>
+            <a:off x="3319051" y="2937613"/>
             <a:ext cx="1250877" cy="192220"/>
           </a:xfrm>
           <a:prstGeom prst="rect">
@@ -18022,7 +18412,7 @@
           <a:solidFill>
             <a:srgbClr val="FF3300"/>
           </a:solidFill>
-          <a:ln>
+          <a:ln w="19050">
             <a:solidFill>
               <a:schemeClr val="tx1"/>
             </a:solidFill>
@@ -18067,10 +18457,10 @@
       </p:sp>
       <p:sp>
         <p:nvSpPr>
-          <p:cNvPr id="84" name="Right Triangle 83">
-            <a:extLst>
-              <a:ext uri="{FF2B5EF4-FFF2-40B4-BE49-F238E27FC236}">
-                <a16:creationId xmlns:a16="http://schemas.microsoft.com/office/drawing/2014/main" id="{44729C57-9B20-4149-B35B-E614A20E16B0}"/>
+          <p:cNvPr id="45" name="Right Triangle 44">
+            <a:extLst>
+              <a:ext uri="{FF2B5EF4-FFF2-40B4-BE49-F238E27FC236}">
+                <a16:creationId xmlns:a16="http://schemas.microsoft.com/office/drawing/2014/main" id="{04A47B73-3F32-4EA6-9DF4-96769E3B25F8}"/>
               </a:ext>
             </a:extLst>
           </p:cNvPr>
@@ -18079,7 +18469,7 @@
         </p:nvSpPr>
         <p:spPr>
           <a:xfrm>
-            <a:off x="4424727" y="3630970"/>
+            <a:off x="4418340" y="3630971"/>
             <a:ext cx="55917" cy="55917"/>
           </a:xfrm>
           <a:prstGeom prst="rtTriangle">
@@ -18088,7 +18478,7 @@
           <a:solidFill>
             <a:srgbClr val="FF3300"/>
           </a:solidFill>
-          <a:ln>
+          <a:ln w="19050">
             <a:solidFill>
               <a:srgbClr val="FF0000"/>
             </a:solidFill>
@@ -18121,10 +18511,10 @@
       </p:sp>
       <p:sp>
         <p:nvSpPr>
-          <p:cNvPr id="85" name="Rectangle 84">
-            <a:extLst>
-              <a:ext uri="{FF2B5EF4-FFF2-40B4-BE49-F238E27FC236}">
-                <a16:creationId xmlns:a16="http://schemas.microsoft.com/office/drawing/2014/main" id="{E92B2ACE-8CCE-4C25-B78F-A6619D9240F5}"/>
+          <p:cNvPr id="46" name="Rectangle 45">
+            <a:extLst>
+              <a:ext uri="{FF2B5EF4-FFF2-40B4-BE49-F238E27FC236}">
+                <a16:creationId xmlns:a16="http://schemas.microsoft.com/office/drawing/2014/main" id="{72AA6C91-6963-47AC-933A-BCEE496E873F}"/>
               </a:ext>
             </a:extLst>
           </p:cNvPr>
@@ -18133,7 +18523,7 @@
         </p:nvSpPr>
         <p:spPr>
           <a:xfrm>
-            <a:off x="4426465" y="3690226"/>
+            <a:off x="4420078" y="3683877"/>
             <a:ext cx="55917" cy="157269"/>
           </a:xfrm>
           <a:prstGeom prst="rect">
@@ -18142,7 +18532,7 @@
           <a:solidFill>
             <a:srgbClr val="FF3300"/>
           </a:solidFill>
-          <a:ln>
+          <a:ln w="19050">
             <a:solidFill>
               <a:srgbClr val="FF3300"/>
             </a:solidFill>
@@ -18182,10 +18572,10 @@
       </p:sp>
       <p:sp>
         <p:nvSpPr>
-          <p:cNvPr id="86" name="Rectangle 85">
-            <a:extLst>
-              <a:ext uri="{FF2B5EF4-FFF2-40B4-BE49-F238E27FC236}">
-                <a16:creationId xmlns:a16="http://schemas.microsoft.com/office/drawing/2014/main" id="{4E5B9F5E-2E12-4008-80C7-7A8CAE58D941}"/>
+          <p:cNvPr id="47" name="Rectangle 46">
+            <a:extLst>
+              <a:ext uri="{FF2B5EF4-FFF2-40B4-BE49-F238E27FC236}">
+                <a16:creationId xmlns:a16="http://schemas.microsoft.com/office/drawing/2014/main" id="{8AB4FB36-C4A7-4AB2-B106-D4804E1FAFBC}"/>
               </a:ext>
             </a:extLst>
           </p:cNvPr>
@@ -18194,7 +18584,7 @@
         </p:nvSpPr>
         <p:spPr>
           <a:xfrm>
-            <a:off x="4270044" y="3620557"/>
+            <a:off x="4265468" y="3649186"/>
             <a:ext cx="160273" cy="60479"/>
           </a:xfrm>
           <a:prstGeom prst="rect">
@@ -18203,7 +18593,7 @@
           <a:solidFill>
             <a:srgbClr val="FF3300"/>
           </a:solidFill>
-          <a:ln>
+          <a:ln w="19050">
             <a:solidFill>
               <a:srgbClr val="FF3300"/>
             </a:solidFill>
@@ -18236,10 +18626,10 @@
       </p:sp>
       <p:sp>
         <p:nvSpPr>
-          <p:cNvPr id="87" name="Arc 86">
-            <a:extLst>
-              <a:ext uri="{FF2B5EF4-FFF2-40B4-BE49-F238E27FC236}">
-                <a16:creationId xmlns:a16="http://schemas.microsoft.com/office/drawing/2014/main" id="{D8641D32-ADDB-4D00-8A10-503FD3D4EEFF}"/>
+          <p:cNvPr id="48" name="Arc 47">
+            <a:extLst>
+              <a:ext uri="{FF2B5EF4-FFF2-40B4-BE49-F238E27FC236}">
+                <a16:creationId xmlns:a16="http://schemas.microsoft.com/office/drawing/2014/main" id="{52B0E13D-2F67-46C3-B1AB-60D47371DC67}"/>
               </a:ext>
             </a:extLst>
           </p:cNvPr>
@@ -18248,17 +18638,17 @@
         </p:nvSpPr>
         <p:spPr>
           <a:xfrm rot="10800000">
-            <a:off x="4429999" y="3501699"/>
+            <a:off x="4418073" y="3516017"/>
             <a:ext cx="176376" cy="185188"/>
           </a:xfrm>
           <a:prstGeom prst="arc">
             <a:avLst>
               <a:gd name="adj1" fmla="val 15927728"/>
-              <a:gd name="adj2" fmla="val 21465054"/>
+              <a:gd name="adj2" fmla="val 21212189"/>
             </a:avLst>
           </a:prstGeom>
           <a:noFill/>
-          <a:ln w="12700">
+          <a:ln w="19050">
             <a:solidFill>
               <a:srgbClr val="FF3300"/>
             </a:solidFill>
@@ -18293,10 +18683,10 @@
       </p:sp>
       <p:sp>
         <p:nvSpPr>
-          <p:cNvPr id="88" name="Rectangle 87">
-            <a:extLst>
-              <a:ext uri="{FF2B5EF4-FFF2-40B4-BE49-F238E27FC236}">
-                <a16:creationId xmlns:a16="http://schemas.microsoft.com/office/drawing/2014/main" id="{F1587A8E-8E12-4DB2-B0A4-6FD1A52DD425}"/>
+          <p:cNvPr id="52" name="Rectangle 51">
+            <a:extLst>
+              <a:ext uri="{FF2B5EF4-FFF2-40B4-BE49-F238E27FC236}">
+                <a16:creationId xmlns:a16="http://schemas.microsoft.com/office/drawing/2014/main" id="{097D7CC9-37DD-4832-A202-BE0EBF99280E}"/>
               </a:ext>
             </a:extLst>
           </p:cNvPr>
@@ -18305,7 +18695,7 @@
         </p:nvSpPr>
         <p:spPr>
           <a:xfrm rot="5400000">
-            <a:off x="7142077" y="2782812"/>
+            <a:off x="3883539" y="2782813"/>
             <a:ext cx="152441" cy="157163"/>
           </a:xfrm>
           <a:prstGeom prst="rect">
@@ -18314,7 +18704,7 @@
           <a:solidFill>
             <a:srgbClr val="FF3300"/>
           </a:solidFill>
-          <a:ln>
+          <a:ln w="19050">
             <a:solidFill>
               <a:schemeClr val="tx1"/>
             </a:solidFill>
@@ -18354,10 +18744,10 @@
       </p:sp>
       <p:sp>
         <p:nvSpPr>
-          <p:cNvPr id="89" name="Rectangle 88">
-            <a:extLst>
-              <a:ext uri="{FF2B5EF4-FFF2-40B4-BE49-F238E27FC236}">
-                <a16:creationId xmlns:a16="http://schemas.microsoft.com/office/drawing/2014/main" id="{600B64A6-DC4A-4923-B9C3-4BCBCD8FCB73}"/>
+          <p:cNvPr id="53" name="Flowchart: Manual Input 52">
+            <a:extLst>
+              <a:ext uri="{FF2B5EF4-FFF2-40B4-BE49-F238E27FC236}">
+                <a16:creationId xmlns:a16="http://schemas.microsoft.com/office/drawing/2014/main" id="{0CAEA123-95BA-4785-92EB-23427C7B4C79}"/>
               </a:ext>
             </a:extLst>
           </p:cNvPr>
@@ -18365,22 +18755,27 @@
           <p:nvPr/>
         </p:nvSpPr>
         <p:spPr>
-          <a:xfrm rot="5400000">
-            <a:off x="3874655" y="2782621"/>
-            <a:ext cx="152441" cy="157163"/>
-          </a:xfrm>
-          <a:prstGeom prst="rect">
+          <a:xfrm rot="16200000">
+            <a:off x="3467200" y="2331971"/>
+            <a:ext cx="192924" cy="720727"/>
+          </a:xfrm>
+          <a:prstGeom prst="flowChartManualInput">
             <a:avLst/>
           </a:prstGeom>
           <a:solidFill>
             <a:srgbClr val="FF3300"/>
           </a:solidFill>
-          <a:ln>
+          <a:ln w="19050">
             <a:solidFill>
               <a:schemeClr val="tx1"/>
             </a:solidFill>
           </a:ln>
           <a:effectLst>
+            <a:outerShdw blurRad="25400" dist="50800" dir="3960000" sx="81000" sy="81000" algn="ctr" rotWithShape="0">
+              <a:srgbClr val="000000">
+                <a:alpha val="17000"/>
+              </a:srgbClr>
+            </a:outerShdw>
             <a:softEdge rad="0"/>
           </a:effectLst>
         </p:spPr>
@@ -18401,7 +18796,12 @@
           </a:fontRef>
         </p:style>
         <p:txBody>
-          <a:bodyPr rtlCol="0" anchor="ctr"/>
+          <a:bodyPr rot="0" spcFirstLastPara="0" vertOverflow="overflow" horzOverflow="overflow" vert="horz" wrap="square" lIns="91440" tIns="45720" rIns="91440" bIns="45720" numCol="1" spcCol="0" rtlCol="0" fromWordArt="0" anchor="ctr" anchorCtr="0" forceAA="0" compatLnSpc="1">
+            <a:prstTxWarp prst="textNoShape">
+              <a:avLst/>
+            </a:prstTxWarp>
+            <a:noAutofit/>
+          </a:bodyPr>
           <a:lstStyle/>
           <a:p>
             <a:pPr algn="ctr"/>
@@ -18413,497 +18813,140 @@
           </a:p>
         </p:txBody>
       </p:sp>
-      <p:grpSp>
-        <p:nvGrpSpPr>
-          <p:cNvPr id="90" name="Group 89">
-            <a:extLst>
-              <a:ext uri="{FF2B5EF4-FFF2-40B4-BE49-F238E27FC236}">
-                <a16:creationId xmlns:a16="http://schemas.microsoft.com/office/drawing/2014/main" id="{14903E91-5597-4091-AB10-4EDF60A106C4}"/>
-              </a:ext>
-            </a:extLst>
-          </p:cNvPr>
-          <p:cNvGrpSpPr/>
-          <p:nvPr/>
-        </p:nvGrpSpPr>
-        <p:grpSpPr>
+      <p:sp>
+        <p:nvSpPr>
+          <p:cNvPr id="54" name="Flowchart: Manual Input 53">
+            <a:extLst>
+              <a:ext uri="{FF2B5EF4-FFF2-40B4-BE49-F238E27FC236}">
+                <a16:creationId xmlns:a16="http://schemas.microsoft.com/office/drawing/2014/main" id="{C72E9CED-79E7-4B1F-8755-DC32886BC4D6}"/>
+              </a:ext>
+            </a:extLst>
+          </p:cNvPr>
+          <p:cNvSpPr/>
+          <p:nvPr/>
+        </p:nvSpPr>
+        <p:spPr>
+          <a:xfrm rot="16200000" flipV="1">
+            <a:off x="4213876" y="2306023"/>
+            <a:ext cx="192924" cy="772624"/>
+          </a:xfrm>
+          <a:prstGeom prst="flowChartManualInput">
+            <a:avLst/>
+          </a:prstGeom>
+          <a:solidFill>
+            <a:srgbClr val="FF3300"/>
+          </a:solidFill>
+          <a:ln w="19050">
+            <a:solidFill>
+              <a:schemeClr val="tx1"/>
+            </a:solidFill>
+          </a:ln>
+          <a:effectLst>
+            <a:outerShdw blurRad="25400" dist="50800" dir="3960000" sx="81000" sy="81000" algn="ctr" rotWithShape="0">
+              <a:srgbClr val="000000">
+                <a:alpha val="17000"/>
+              </a:srgbClr>
+            </a:outerShdw>
+            <a:softEdge rad="0"/>
+          </a:effectLst>
+        </p:spPr>
+        <p:style>
+          <a:lnRef idx="2">
+            <a:schemeClr val="accent1">
+              <a:shade val="50000"/>
+            </a:schemeClr>
+          </a:lnRef>
+          <a:fillRef idx="1">
+            <a:schemeClr val="accent1"/>
+          </a:fillRef>
+          <a:effectRef idx="0">
+            <a:schemeClr val="accent1"/>
+          </a:effectRef>
+          <a:fontRef idx="minor">
+            <a:schemeClr val="lt1"/>
+          </a:fontRef>
+        </p:style>
+        <p:txBody>
+          <a:bodyPr rot="0" spcFirstLastPara="0" vertOverflow="overflow" horzOverflow="overflow" vert="horz" wrap="square" lIns="91440" tIns="45720" rIns="91440" bIns="45720" numCol="1" spcCol="0" rtlCol="0" fromWordArt="0" anchor="ctr" anchorCtr="0" forceAA="0" compatLnSpc="1">
+            <a:prstTxWarp prst="textNoShape">
+              <a:avLst/>
+            </a:prstTxWarp>
+            <a:noAutofit/>
+          </a:bodyPr>
+          <a:lstStyle/>
+          <a:p>
+            <a:pPr algn="ctr"/>
+            <a:endParaRPr lang="en-US">
+              <a:solidFill>
+                <a:srgbClr val="FF0000"/>
+              </a:solidFill>
+            </a:endParaRPr>
+          </a:p>
+        </p:txBody>
+      </p:sp>
+      <p:sp>
+        <p:nvSpPr>
+          <p:cNvPr id="55" name="Flowchart: Process 54">
+            <a:extLst>
+              <a:ext uri="{FF2B5EF4-FFF2-40B4-BE49-F238E27FC236}">
+                <a16:creationId xmlns:a16="http://schemas.microsoft.com/office/drawing/2014/main" id="{C1779879-B642-44A5-AD6D-4394B145BB4B}"/>
+              </a:ext>
+            </a:extLst>
+          </p:cNvPr>
+          <p:cNvSpPr/>
+          <p:nvPr/>
+        </p:nvSpPr>
+        <p:spPr>
           <a:xfrm>
-            <a:off x="6461836" y="2595872"/>
-            <a:ext cx="1493352" cy="192924"/>
-            <a:chOff x="5902743" y="4726011"/>
-            <a:chExt cx="1493352" cy="192924"/>
-          </a:xfrm>
-        </p:grpSpPr>
-        <p:sp>
-          <p:nvSpPr>
-            <p:cNvPr id="91" name="Flowchart: Manual Input 90">
-              <a:extLst>
-                <a:ext uri="{FF2B5EF4-FFF2-40B4-BE49-F238E27FC236}">
-                  <a16:creationId xmlns:a16="http://schemas.microsoft.com/office/drawing/2014/main" id="{596BE511-5991-4106-950B-672CA5B13121}"/>
-                </a:ext>
-              </a:extLst>
-            </p:cNvPr>
-            <p:cNvSpPr/>
-            <p:nvPr/>
-          </p:nvSpPr>
-          <p:spPr>
-            <a:xfrm rot="16200000">
-              <a:off x="6166645" y="4462109"/>
-              <a:ext cx="192924" cy="720727"/>
-            </a:xfrm>
-            <a:prstGeom prst="flowChartManualInput">
-              <a:avLst/>
-            </a:prstGeom>
+            <a:off x="3881178" y="2615973"/>
+            <a:ext cx="117475" cy="152721"/>
+          </a:xfrm>
+          <a:prstGeom prst="flowChartProcess">
+            <a:avLst/>
+          </a:prstGeom>
+          <a:solidFill>
+            <a:srgbClr val="FF3300"/>
+          </a:solidFill>
+          <a:ln w="19050">
             <a:solidFill>
               <a:srgbClr val="FF3300"/>
             </a:solidFill>
-            <a:ln>
+          </a:ln>
+          <a:effectLst>
+            <a:softEdge rad="0"/>
+          </a:effectLst>
+        </p:spPr>
+        <p:style>
+          <a:lnRef idx="2">
+            <a:schemeClr val="accent1">
+              <a:shade val="50000"/>
+            </a:schemeClr>
+          </a:lnRef>
+          <a:fillRef idx="1">
+            <a:schemeClr val="accent1"/>
+          </a:fillRef>
+          <a:effectRef idx="0">
+            <a:schemeClr val="accent1"/>
+          </a:effectRef>
+          <a:fontRef idx="minor">
+            <a:schemeClr val="lt1"/>
+          </a:fontRef>
+        </p:style>
+        <p:txBody>
+          <a:bodyPr rot="0" spcFirstLastPara="0" vertOverflow="overflow" horzOverflow="overflow" vert="horz" wrap="square" lIns="91440" tIns="45720" rIns="91440" bIns="45720" numCol="1" spcCol="0" rtlCol="0" fromWordArt="0" anchor="ctr" anchorCtr="0" forceAA="0" compatLnSpc="1">
+            <a:prstTxWarp prst="textNoShape">
+              <a:avLst/>
+            </a:prstTxWarp>
+            <a:noAutofit/>
+          </a:bodyPr>
+          <a:lstStyle/>
+          <a:p>
+            <a:pPr algn="ctr"/>
+            <a:endParaRPr lang="en-US">
               <a:solidFill>
-                <a:schemeClr val="tx1"/>
+                <a:srgbClr val="FF0000"/>
               </a:solidFill>
-            </a:ln>
-            <a:effectLst>
-              <a:outerShdw blurRad="25400" dist="50800" dir="3960000" sx="81000" sy="81000" algn="ctr" rotWithShape="0">
-                <a:srgbClr val="000000">
-                  <a:alpha val="17000"/>
-                </a:srgbClr>
-              </a:outerShdw>
-              <a:softEdge rad="0"/>
-            </a:effectLst>
-          </p:spPr>
-          <p:style>
-            <a:lnRef idx="2">
-              <a:schemeClr val="accent1">
-                <a:shade val="50000"/>
-              </a:schemeClr>
-            </a:lnRef>
-            <a:fillRef idx="1">
-              <a:schemeClr val="accent1"/>
-            </a:fillRef>
-            <a:effectRef idx="0">
-              <a:schemeClr val="accent1"/>
-            </a:effectRef>
-            <a:fontRef idx="minor">
-              <a:schemeClr val="lt1"/>
-            </a:fontRef>
-          </p:style>
-          <p:txBody>
-            <a:bodyPr rot="0" spcFirstLastPara="0" vertOverflow="overflow" horzOverflow="overflow" vert="horz" wrap="square" lIns="91440" tIns="45720" rIns="91440" bIns="45720" numCol="1" spcCol="0" rtlCol="0" fromWordArt="0" anchor="ctr" anchorCtr="0" forceAA="0" compatLnSpc="1">
-              <a:prstTxWarp prst="textNoShape">
-                <a:avLst/>
-              </a:prstTxWarp>
-              <a:noAutofit/>
-            </a:bodyPr>
-            <a:lstStyle/>
-            <a:p>
-              <a:pPr algn="ctr"/>
-              <a:endParaRPr lang="en-US">
-                <a:solidFill>
-                  <a:srgbClr val="FF0000"/>
-                </a:solidFill>
-              </a:endParaRPr>
-            </a:p>
-          </p:txBody>
-        </p:sp>
-        <p:sp>
-          <p:nvSpPr>
-            <p:cNvPr id="92" name="Flowchart: Manual Input 91">
-              <a:extLst>
-                <a:ext uri="{FF2B5EF4-FFF2-40B4-BE49-F238E27FC236}">
-                  <a16:creationId xmlns:a16="http://schemas.microsoft.com/office/drawing/2014/main" id="{964449BE-2B2E-43A2-915B-4AE5F260C543}"/>
-                </a:ext>
-              </a:extLst>
-            </p:cNvPr>
-            <p:cNvSpPr/>
-            <p:nvPr/>
-          </p:nvSpPr>
-          <p:spPr>
-            <a:xfrm rot="16200000" flipV="1">
-              <a:off x="6913321" y="4436161"/>
-              <a:ext cx="192924" cy="772624"/>
-            </a:xfrm>
-            <a:prstGeom prst="flowChartManualInput">
-              <a:avLst/>
-            </a:prstGeom>
-            <a:solidFill>
-              <a:srgbClr val="FF3300"/>
-            </a:solidFill>
-            <a:ln>
-              <a:solidFill>
-                <a:schemeClr val="tx1"/>
-              </a:solidFill>
-            </a:ln>
-            <a:effectLst>
-              <a:outerShdw blurRad="25400" dist="50800" dir="3960000" sx="81000" sy="81000" algn="ctr" rotWithShape="0">
-                <a:srgbClr val="000000">
-                  <a:alpha val="17000"/>
-                </a:srgbClr>
-              </a:outerShdw>
-              <a:softEdge rad="0"/>
-            </a:effectLst>
-          </p:spPr>
-          <p:style>
-            <a:lnRef idx="2">
-              <a:schemeClr val="accent1">
-                <a:shade val="50000"/>
-              </a:schemeClr>
-            </a:lnRef>
-            <a:fillRef idx="1">
-              <a:schemeClr val="accent1"/>
-            </a:fillRef>
-            <a:effectRef idx="0">
-              <a:schemeClr val="accent1"/>
-            </a:effectRef>
-            <a:fontRef idx="minor">
-              <a:schemeClr val="lt1"/>
-            </a:fontRef>
-          </p:style>
-          <p:txBody>
-            <a:bodyPr rot="0" spcFirstLastPara="0" vertOverflow="overflow" horzOverflow="overflow" vert="horz" wrap="square" lIns="91440" tIns="45720" rIns="91440" bIns="45720" numCol="1" spcCol="0" rtlCol="0" fromWordArt="0" anchor="ctr" anchorCtr="0" forceAA="0" compatLnSpc="1">
-              <a:prstTxWarp prst="textNoShape">
-                <a:avLst/>
-              </a:prstTxWarp>
-              <a:noAutofit/>
-            </a:bodyPr>
-            <a:lstStyle/>
-            <a:p>
-              <a:pPr algn="ctr"/>
-              <a:endParaRPr lang="en-US">
-                <a:solidFill>
-                  <a:srgbClr val="FF0000"/>
-                </a:solidFill>
-              </a:endParaRPr>
-            </a:p>
-          </p:txBody>
-        </p:sp>
-        <p:sp>
-          <p:nvSpPr>
-            <p:cNvPr id="93" name="Flowchart: Process 92">
-              <a:extLst>
-                <a:ext uri="{FF2B5EF4-FFF2-40B4-BE49-F238E27FC236}">
-                  <a16:creationId xmlns:a16="http://schemas.microsoft.com/office/drawing/2014/main" id="{15A917B5-7B34-4190-A6C2-5DC3A64DDD42}"/>
-                </a:ext>
-              </a:extLst>
-            </p:cNvPr>
-            <p:cNvSpPr/>
-            <p:nvPr/>
-          </p:nvSpPr>
-          <p:spPr>
-            <a:xfrm>
-              <a:off x="6564732" y="4738150"/>
-              <a:ext cx="117475" cy="168643"/>
-            </a:xfrm>
-            <a:prstGeom prst="flowChartProcess">
-              <a:avLst/>
-            </a:prstGeom>
-            <a:solidFill>
-              <a:srgbClr val="FF3300"/>
-            </a:solidFill>
-            <a:ln>
-              <a:solidFill>
-                <a:srgbClr val="FF3300"/>
-              </a:solidFill>
-            </a:ln>
-            <a:effectLst>
-              <a:softEdge rad="0"/>
-            </a:effectLst>
-          </p:spPr>
-          <p:style>
-            <a:lnRef idx="2">
-              <a:schemeClr val="accent1">
-                <a:shade val="50000"/>
-              </a:schemeClr>
-            </a:lnRef>
-            <a:fillRef idx="1">
-              <a:schemeClr val="accent1"/>
-            </a:fillRef>
-            <a:effectRef idx="0">
-              <a:schemeClr val="accent1"/>
-            </a:effectRef>
-            <a:fontRef idx="minor">
-              <a:schemeClr val="lt1"/>
-            </a:fontRef>
-          </p:style>
-          <p:txBody>
-            <a:bodyPr rot="0" spcFirstLastPara="0" vertOverflow="overflow" horzOverflow="overflow" vert="horz" wrap="square" lIns="91440" tIns="45720" rIns="91440" bIns="45720" numCol="1" spcCol="0" rtlCol="0" fromWordArt="0" anchor="ctr" anchorCtr="0" forceAA="0" compatLnSpc="1">
-              <a:prstTxWarp prst="textNoShape">
-                <a:avLst/>
-              </a:prstTxWarp>
-              <a:noAutofit/>
-            </a:bodyPr>
-            <a:lstStyle/>
-            <a:p>
-              <a:pPr algn="ctr"/>
-              <a:endParaRPr lang="en-US">
-                <a:solidFill>
-                  <a:srgbClr val="FF0000"/>
-                </a:solidFill>
-              </a:endParaRPr>
-            </a:p>
-          </p:txBody>
-        </p:sp>
-      </p:grpSp>
-      <p:grpSp>
-        <p:nvGrpSpPr>
-          <p:cNvPr id="94" name="Group 93">
-            <a:extLst>
-              <a:ext uri="{FF2B5EF4-FFF2-40B4-BE49-F238E27FC236}">
-                <a16:creationId xmlns:a16="http://schemas.microsoft.com/office/drawing/2014/main" id="{22E8AB62-F148-42EB-ACF4-71C7DFC3DCAE}"/>
-              </a:ext>
-            </a:extLst>
-          </p:cNvPr>
-          <p:cNvGrpSpPr/>
-          <p:nvPr/>
-        </p:nvGrpSpPr>
-        <p:grpSpPr>
-          <a:xfrm>
-            <a:off x="3194855" y="2598669"/>
-            <a:ext cx="1493352" cy="192924"/>
-            <a:chOff x="5902743" y="4726011"/>
-            <a:chExt cx="1493352" cy="192924"/>
-          </a:xfrm>
-        </p:grpSpPr>
-        <p:sp>
-          <p:nvSpPr>
-            <p:cNvPr id="95" name="Flowchart: Manual Input 94">
-              <a:extLst>
-                <a:ext uri="{FF2B5EF4-FFF2-40B4-BE49-F238E27FC236}">
-                  <a16:creationId xmlns:a16="http://schemas.microsoft.com/office/drawing/2014/main" id="{D68C7F7F-7B73-471B-85C5-BE7DEFF225E8}"/>
-                </a:ext>
-              </a:extLst>
-            </p:cNvPr>
-            <p:cNvSpPr/>
-            <p:nvPr/>
-          </p:nvSpPr>
-          <p:spPr>
-            <a:xfrm rot="16200000">
-              <a:off x="6166645" y="4462109"/>
-              <a:ext cx="192924" cy="720727"/>
-            </a:xfrm>
-            <a:prstGeom prst="flowChartManualInput">
-              <a:avLst/>
-            </a:prstGeom>
-            <a:solidFill>
-              <a:srgbClr val="FF3300"/>
-            </a:solidFill>
-            <a:ln>
-              <a:solidFill>
-                <a:schemeClr val="tx1"/>
-              </a:solidFill>
-            </a:ln>
-            <a:effectLst>
-              <a:outerShdw blurRad="25400" dist="50800" dir="3960000" sx="81000" sy="81000" algn="ctr" rotWithShape="0">
-                <a:srgbClr val="000000">
-                  <a:alpha val="17000"/>
-                </a:srgbClr>
-              </a:outerShdw>
-              <a:softEdge rad="0"/>
-            </a:effectLst>
-          </p:spPr>
-          <p:style>
-            <a:lnRef idx="2">
-              <a:schemeClr val="accent1">
-                <a:shade val="50000"/>
-              </a:schemeClr>
-            </a:lnRef>
-            <a:fillRef idx="1">
-              <a:schemeClr val="accent1"/>
-            </a:fillRef>
-            <a:effectRef idx="0">
-              <a:schemeClr val="accent1"/>
-            </a:effectRef>
-            <a:fontRef idx="minor">
-              <a:schemeClr val="lt1"/>
-            </a:fontRef>
-          </p:style>
-          <p:txBody>
-            <a:bodyPr rot="0" spcFirstLastPara="0" vertOverflow="overflow" horzOverflow="overflow" vert="horz" wrap="square" lIns="91440" tIns="45720" rIns="91440" bIns="45720" numCol="1" spcCol="0" rtlCol="0" fromWordArt="0" anchor="ctr" anchorCtr="0" forceAA="0" compatLnSpc="1">
-              <a:prstTxWarp prst="textNoShape">
-                <a:avLst/>
-              </a:prstTxWarp>
-              <a:noAutofit/>
-            </a:bodyPr>
-            <a:lstStyle/>
-            <a:p>
-              <a:pPr algn="ctr"/>
-              <a:endParaRPr lang="en-US">
-                <a:solidFill>
-                  <a:srgbClr val="FF0000"/>
-                </a:solidFill>
-              </a:endParaRPr>
-            </a:p>
-          </p:txBody>
-        </p:sp>
-        <p:sp>
-          <p:nvSpPr>
-            <p:cNvPr id="96" name="Flowchart: Manual Input 95">
-              <a:extLst>
-                <a:ext uri="{FF2B5EF4-FFF2-40B4-BE49-F238E27FC236}">
-                  <a16:creationId xmlns:a16="http://schemas.microsoft.com/office/drawing/2014/main" id="{916F36A0-B0D8-4AB0-BA75-B076762F2D90}"/>
-                </a:ext>
-              </a:extLst>
-            </p:cNvPr>
-            <p:cNvSpPr/>
-            <p:nvPr/>
-          </p:nvSpPr>
-          <p:spPr>
-            <a:xfrm rot="16200000" flipV="1">
-              <a:off x="6913321" y="4436161"/>
-              <a:ext cx="192924" cy="772624"/>
-            </a:xfrm>
-            <a:prstGeom prst="flowChartManualInput">
-              <a:avLst/>
-            </a:prstGeom>
-            <a:solidFill>
-              <a:srgbClr val="FF3300"/>
-            </a:solidFill>
-            <a:ln>
-              <a:solidFill>
-                <a:schemeClr val="tx1"/>
-              </a:solidFill>
-            </a:ln>
-            <a:effectLst>
-              <a:outerShdw blurRad="25400" dist="50800" dir="3960000" sx="81000" sy="81000" algn="ctr" rotWithShape="0">
-                <a:srgbClr val="000000">
-                  <a:alpha val="17000"/>
-                </a:srgbClr>
-              </a:outerShdw>
-              <a:softEdge rad="0"/>
-            </a:effectLst>
-          </p:spPr>
-          <p:style>
-            <a:lnRef idx="2">
-              <a:schemeClr val="accent1">
-                <a:shade val="50000"/>
-              </a:schemeClr>
-            </a:lnRef>
-            <a:fillRef idx="1">
-              <a:schemeClr val="accent1"/>
-            </a:fillRef>
-            <a:effectRef idx="0">
-              <a:schemeClr val="accent1"/>
-            </a:effectRef>
-            <a:fontRef idx="minor">
-              <a:schemeClr val="lt1"/>
-            </a:fontRef>
-          </p:style>
-          <p:txBody>
-            <a:bodyPr rot="0" spcFirstLastPara="0" vertOverflow="overflow" horzOverflow="overflow" vert="horz" wrap="square" lIns="91440" tIns="45720" rIns="91440" bIns="45720" numCol="1" spcCol="0" rtlCol="0" fromWordArt="0" anchor="ctr" anchorCtr="0" forceAA="0" compatLnSpc="1">
-              <a:prstTxWarp prst="textNoShape">
-                <a:avLst/>
-              </a:prstTxWarp>
-              <a:noAutofit/>
-            </a:bodyPr>
-            <a:lstStyle/>
-            <a:p>
-              <a:pPr algn="ctr"/>
-              <a:endParaRPr lang="en-US">
-                <a:solidFill>
-                  <a:srgbClr val="FF0000"/>
-                </a:solidFill>
-              </a:endParaRPr>
-            </a:p>
-          </p:txBody>
-        </p:sp>
-        <p:sp>
-          <p:nvSpPr>
-            <p:cNvPr id="97" name="Flowchart: Process 96">
-              <a:extLst>
-                <a:ext uri="{FF2B5EF4-FFF2-40B4-BE49-F238E27FC236}">
-                  <a16:creationId xmlns:a16="http://schemas.microsoft.com/office/drawing/2014/main" id="{3E4E9954-FF48-410F-BF89-16E1AA961AD3}"/>
-                </a:ext>
-              </a:extLst>
-            </p:cNvPr>
-            <p:cNvSpPr/>
-            <p:nvPr/>
-          </p:nvSpPr>
-          <p:spPr>
-            <a:xfrm>
-              <a:off x="6564732" y="4738150"/>
-              <a:ext cx="117475" cy="168643"/>
-            </a:xfrm>
-            <a:prstGeom prst="flowChartProcess">
-              <a:avLst/>
-            </a:prstGeom>
-            <a:solidFill>
-              <a:srgbClr val="FF3300"/>
-            </a:solidFill>
-            <a:ln>
-              <a:solidFill>
-                <a:srgbClr val="FF3300"/>
-              </a:solidFill>
-            </a:ln>
-            <a:effectLst>
-              <a:softEdge rad="0"/>
-            </a:effectLst>
-          </p:spPr>
-          <p:style>
-            <a:lnRef idx="2">
-              <a:schemeClr val="accent1">
-                <a:shade val="50000"/>
-              </a:schemeClr>
-            </a:lnRef>
-            <a:fillRef idx="1">
-              <a:schemeClr val="accent1"/>
-            </a:fillRef>
-            <a:effectRef idx="0">
-              <a:schemeClr val="accent1"/>
-            </a:effectRef>
-            <a:fontRef idx="minor">
-              <a:schemeClr val="lt1"/>
-            </a:fontRef>
-          </p:style>
-          <p:txBody>
-            <a:bodyPr rot="0" spcFirstLastPara="0" vertOverflow="overflow" horzOverflow="overflow" vert="horz" wrap="square" lIns="91440" tIns="45720" rIns="91440" bIns="45720" numCol="1" spcCol="0" rtlCol="0" fromWordArt="0" anchor="ctr" anchorCtr="0" forceAA="0" compatLnSpc="1">
-              <a:prstTxWarp prst="textNoShape">
-                <a:avLst/>
-              </a:prstTxWarp>
-              <a:noAutofit/>
-            </a:bodyPr>
-            <a:lstStyle/>
-            <a:p>
-              <a:pPr algn="ctr"/>
-              <a:endParaRPr lang="en-US">
-                <a:solidFill>
-                  <a:srgbClr val="FF0000"/>
-                </a:solidFill>
-              </a:endParaRPr>
-            </a:p>
-          </p:txBody>
-        </p:sp>
-      </p:grpSp>
-      <p:sp>
-        <p:nvSpPr>
-          <p:cNvPr id="99" name="TextBox 98">
-            <a:extLst>
-              <a:ext uri="{FF2B5EF4-FFF2-40B4-BE49-F238E27FC236}">
-                <a16:creationId xmlns:a16="http://schemas.microsoft.com/office/drawing/2014/main" id="{1BC5A820-1A8E-4B18-BCCD-D559E1F37E05}"/>
-              </a:ext>
-            </a:extLst>
-          </p:cNvPr>
-          <p:cNvSpPr txBox="1"/>
-          <p:nvPr/>
-        </p:nvSpPr>
-        <p:spPr>
-          <a:xfrm>
-            <a:off x="3079847" y="5324030"/>
-            <a:ext cx="5542860" cy="369332"/>
-          </a:xfrm>
-          <a:prstGeom prst="rect">
-            <a:avLst/>
-          </a:prstGeom>
-          <a:noFill/>
-        </p:spPr>
-        <p:txBody>
-          <a:bodyPr wrap="square" rtlCol="0">
-            <a:spAutoFit/>
-          </a:bodyPr>
-          <a:lstStyle/>
-          <a:p>
-            <a:r>
-              <a:rPr lang="pt-BR" dirty="0"/>
-              <a:t>VERSAO FINAL - MANTER</a:t>
-            </a:r>
-            <a:endParaRPr lang="en-US" dirty="0"/>
+            </a:endParaRPr>
           </a:p>
         </p:txBody>
       </p:sp>
@@ -18911,6 +18954,36 @@
     <p:extLst>
       <p:ext uri="{BB962C8B-B14F-4D97-AF65-F5344CB8AC3E}">
         <p14:creationId xmlns:p14="http://schemas.microsoft.com/office/powerpoint/2010/main" val="2924733702"/>
+      </p:ext>
+    </p:extLst>
+  </p:cSld>
+  <p:clrMapOvr>
+    <a:masterClrMapping/>
+  </p:clrMapOvr>
+</p:sld>
+</file>
+
+<file path=ppt/slides/slide6.xml><?xml version="1.0" encoding="utf-8"?>
+<p:sld xmlns:a="http://schemas.openxmlformats.org/drawingml/2006/main" xmlns:r="http://schemas.openxmlformats.org/officeDocument/2006/relationships" xmlns:p="http://schemas.openxmlformats.org/presentationml/2006/main">
+  <p:cSld>
+    <p:spTree>
+      <p:nvGrpSpPr>
+        <p:cNvPr id="1" name=""/>
+        <p:cNvGrpSpPr/>
+        <p:nvPr/>
+      </p:nvGrpSpPr>
+      <p:grpSpPr>
+        <a:xfrm>
+          <a:off x="0" y="0"/>
+          <a:ext cx="0" cy="0"/>
+          <a:chOff x="0" y="0"/>
+          <a:chExt cx="0" cy="0"/>
+        </a:xfrm>
+      </p:grpSpPr>
+    </p:spTree>
+    <p:extLst>
+      <p:ext uri="{BB962C8B-B14F-4D97-AF65-F5344CB8AC3E}">
+        <p14:creationId xmlns:p14="http://schemas.microsoft.com/office/powerpoint/2010/main" val="1277895670"/>
       </p:ext>
     </p:extLst>
   </p:cSld>

</xml_diff>